<commit_message>
Fix page numbers on presentation
</commit_message>
<xml_diff>
--- a/Spring-XD-Internals-A-Guided-Tour.pptx
+++ b/Spring-XD-Internals-A-Guided-Tour.pptx
@@ -10671,6 +10671,139 @@
           </a:p>
         </p:txBody>
       </p:sp>
+      <p:sp>
+        <p:nvSpPr>
+          <p:cNvPr id="6" name="Slide Number Placeholder 3"/>
+          <p:cNvSpPr txBox="1">
+            <a:spLocks/>
+          </p:cNvSpPr>
+          <p:nvPr/>
+        </p:nvSpPr>
+        <p:spPr>
+          <a:xfrm>
+            <a:off x="6553200" y="4767263"/>
+            <a:ext cx="2133600" cy="273844"/>
+          </a:xfrm>
+          <a:prstGeom prst="rect">
+            <a:avLst/>
+          </a:prstGeom>
+        </p:spPr>
+        <p:txBody>
+          <a:bodyPr/>
+          <a:lstStyle>
+            <a:defPPr>
+              <a:defRPr lang="en-US"/>
+            </a:defPPr>
+            <a:lvl1pPr marL="0" algn="l" defTabSz="914400" rtl="0" eaLnBrk="1" latinLnBrk="0" hangingPunct="1">
+              <a:defRPr sz="1800" kern="1200">
+                <a:solidFill>
+                  <a:schemeClr val="tx1"/>
+                </a:solidFill>
+                <a:latin typeface="+mn-lt"/>
+                <a:ea typeface="+mn-ea"/>
+                <a:cs typeface="+mn-cs"/>
+              </a:defRPr>
+            </a:lvl1pPr>
+            <a:lvl2pPr marL="457200" algn="l" defTabSz="914400" rtl="0" eaLnBrk="1" latinLnBrk="0" hangingPunct="1">
+              <a:defRPr sz="1800" kern="1200">
+                <a:solidFill>
+                  <a:schemeClr val="tx1"/>
+                </a:solidFill>
+                <a:latin typeface="+mn-lt"/>
+                <a:ea typeface="+mn-ea"/>
+                <a:cs typeface="+mn-cs"/>
+              </a:defRPr>
+            </a:lvl2pPr>
+            <a:lvl3pPr marL="914400" algn="l" defTabSz="914400" rtl="0" eaLnBrk="1" latinLnBrk="0" hangingPunct="1">
+              <a:defRPr sz="1800" kern="1200">
+                <a:solidFill>
+                  <a:schemeClr val="tx1"/>
+                </a:solidFill>
+                <a:latin typeface="+mn-lt"/>
+                <a:ea typeface="+mn-ea"/>
+                <a:cs typeface="+mn-cs"/>
+              </a:defRPr>
+            </a:lvl3pPr>
+            <a:lvl4pPr marL="1371600" algn="l" defTabSz="914400" rtl="0" eaLnBrk="1" latinLnBrk="0" hangingPunct="1">
+              <a:defRPr sz="1800" kern="1200">
+                <a:solidFill>
+                  <a:schemeClr val="tx1"/>
+                </a:solidFill>
+                <a:latin typeface="+mn-lt"/>
+                <a:ea typeface="+mn-ea"/>
+                <a:cs typeface="+mn-cs"/>
+              </a:defRPr>
+            </a:lvl4pPr>
+            <a:lvl5pPr marL="1828800" algn="l" defTabSz="914400" rtl="0" eaLnBrk="1" latinLnBrk="0" hangingPunct="1">
+              <a:defRPr sz="1800" kern="1200">
+                <a:solidFill>
+                  <a:schemeClr val="tx1"/>
+                </a:solidFill>
+                <a:latin typeface="+mn-lt"/>
+                <a:ea typeface="+mn-ea"/>
+                <a:cs typeface="+mn-cs"/>
+              </a:defRPr>
+            </a:lvl5pPr>
+            <a:lvl6pPr marL="2286000" algn="l" defTabSz="914400" rtl="0" eaLnBrk="1" latinLnBrk="0" hangingPunct="1">
+              <a:defRPr sz="1800" kern="1200">
+                <a:solidFill>
+                  <a:schemeClr val="tx1"/>
+                </a:solidFill>
+                <a:latin typeface="+mn-lt"/>
+                <a:ea typeface="+mn-ea"/>
+                <a:cs typeface="+mn-cs"/>
+              </a:defRPr>
+            </a:lvl6pPr>
+            <a:lvl7pPr marL="2743200" algn="l" defTabSz="914400" rtl="0" eaLnBrk="1" latinLnBrk="0" hangingPunct="1">
+              <a:defRPr sz="1800" kern="1200">
+                <a:solidFill>
+                  <a:schemeClr val="tx1"/>
+                </a:solidFill>
+                <a:latin typeface="+mn-lt"/>
+                <a:ea typeface="+mn-ea"/>
+                <a:cs typeface="+mn-cs"/>
+              </a:defRPr>
+            </a:lvl7pPr>
+            <a:lvl8pPr marL="3200400" algn="l" defTabSz="914400" rtl="0" eaLnBrk="1" latinLnBrk="0" hangingPunct="1">
+              <a:defRPr sz="1800" kern="1200">
+                <a:solidFill>
+                  <a:schemeClr val="tx1"/>
+                </a:solidFill>
+                <a:latin typeface="+mn-lt"/>
+                <a:ea typeface="+mn-ea"/>
+                <a:cs typeface="+mn-cs"/>
+              </a:defRPr>
+            </a:lvl8pPr>
+            <a:lvl9pPr marL="3657600" algn="l" defTabSz="914400" rtl="0" eaLnBrk="1" latinLnBrk="0" hangingPunct="1">
+              <a:defRPr sz="1800" kern="1200">
+                <a:solidFill>
+                  <a:schemeClr val="tx1"/>
+                </a:solidFill>
+                <a:latin typeface="+mn-lt"/>
+                <a:ea typeface="+mn-ea"/>
+                <a:cs typeface="+mn-cs"/>
+              </a:defRPr>
+            </a:lvl9pPr>
+          </a:lstStyle>
+          <a:p>
+            <a:pPr algn="r"/>
+            <a:fld id="{3CA7D8A6-1136-4C38-ADB5-83A54ED516A9}" type="slidenum">
+              <a:rPr lang="en-US" sz="1200" smtClean="0">
+                <a:solidFill>
+                  <a:srgbClr val="7F7F7F"/>
+                </a:solidFill>
+              </a:rPr>
+              <a:pPr algn="r"/>
+              <a:t>10</a:t>
+            </a:fld>
+            <a:endParaRPr lang="en-US" sz="1200" dirty="0">
+              <a:solidFill>
+                <a:srgbClr val="7F7F7F"/>
+              </a:solidFill>
+            </a:endParaRPr>
+          </a:p>
+        </p:txBody>
+      </p:sp>
     </p:spTree>
     <p:extLst>
       <p:ext uri="{BB962C8B-B14F-4D97-AF65-F5344CB8AC3E}">
@@ -10830,6 +10963,34 @@
           </a:extLst>
         </p:spPr>
       </p:pic>
+      <p:sp>
+        <p:nvSpPr>
+          <p:cNvPr id="6" name="Slide Number Placeholder 3"/>
+          <p:cNvSpPr>
+            <a:spLocks noGrp="1"/>
+          </p:cNvSpPr>
+          <p:nvPr>
+            <p:ph type="sldNum" sz="quarter" idx="12"/>
+          </p:nvPr>
+        </p:nvSpPr>
+        <p:spPr>
+          <a:xfrm>
+            <a:off x="6553200" y="4767263"/>
+            <a:ext cx="2133600" cy="273844"/>
+          </a:xfrm>
+        </p:spPr>
+        <p:txBody>
+          <a:bodyPr/>
+          <a:lstStyle/>
+          <a:p>
+            <a:fld id="{3CA7D8A6-1136-4C38-ADB5-83A54ED516A9}" type="slidenum">
+              <a:rPr lang="en-US" smtClean="0"/>
+              <a:t>11</a:t>
+            </a:fld>
+            <a:endParaRPr lang="en-US" dirty="0"/>
+          </a:p>
+        </p:txBody>
+      </p:sp>
     </p:spTree>
     <p:extLst>
       <p:ext uri="{BB962C8B-B14F-4D97-AF65-F5344CB8AC3E}">
@@ -10977,6 +11138,34 @@
           </a:p>
         </p:txBody>
       </p:sp>
+      <p:sp>
+        <p:nvSpPr>
+          <p:cNvPr id="4" name="Slide Number Placeholder 3"/>
+          <p:cNvSpPr>
+            <a:spLocks noGrp="1"/>
+          </p:cNvSpPr>
+          <p:nvPr>
+            <p:ph type="sldNum" sz="quarter" idx="12"/>
+          </p:nvPr>
+        </p:nvSpPr>
+        <p:spPr>
+          <a:xfrm>
+            <a:off x="6553200" y="4767263"/>
+            <a:ext cx="2133600" cy="273844"/>
+          </a:xfrm>
+        </p:spPr>
+        <p:txBody>
+          <a:bodyPr/>
+          <a:lstStyle/>
+          <a:p>
+            <a:fld id="{3CA7D8A6-1136-4C38-ADB5-83A54ED516A9}" type="slidenum">
+              <a:rPr lang="en-US" smtClean="0"/>
+              <a:t>12</a:t>
+            </a:fld>
+            <a:endParaRPr lang="en-US" dirty="0"/>
+          </a:p>
+        </p:txBody>
+      </p:sp>
     </p:spTree>
     <p:extLst>
       <p:ext uri="{BB962C8B-B14F-4D97-AF65-F5344CB8AC3E}">
@@ -11169,6 +11358,34 @@
           </a:p>
         </p:txBody>
       </p:sp>
+      <p:sp>
+        <p:nvSpPr>
+          <p:cNvPr id="4" name="Slide Number Placeholder 3"/>
+          <p:cNvSpPr>
+            <a:spLocks noGrp="1"/>
+          </p:cNvSpPr>
+          <p:nvPr>
+            <p:ph type="sldNum" sz="quarter" idx="12"/>
+          </p:nvPr>
+        </p:nvSpPr>
+        <p:spPr>
+          <a:xfrm>
+            <a:off x="6553200" y="4767263"/>
+            <a:ext cx="2133600" cy="273844"/>
+          </a:xfrm>
+        </p:spPr>
+        <p:txBody>
+          <a:bodyPr/>
+          <a:lstStyle/>
+          <a:p>
+            <a:fld id="{3CA7D8A6-1136-4C38-ADB5-83A54ED516A9}" type="slidenum">
+              <a:rPr lang="en-US" smtClean="0"/>
+              <a:t>13</a:t>
+            </a:fld>
+            <a:endParaRPr lang="en-US" dirty="0"/>
+          </a:p>
+        </p:txBody>
+      </p:sp>
     </p:spTree>
     <p:extLst>
       <p:ext uri="{BB962C8B-B14F-4D97-AF65-F5344CB8AC3E}">
@@ -11243,14 +11460,10 @@
             <a:spLocks noGrp="1"/>
           </p:cNvSpPr>
           <p:nvPr>
-            <p:ph type="body" idx="1"/>
+            <p:ph idx="1"/>
           </p:nvPr>
         </p:nvSpPr>
         <p:spPr>
-          <a:xfrm>
-            <a:off x="457200" y="1200150"/>
-            <a:ext cx="8229600" cy="3570178"/>
-          </a:xfrm>
           <a:prstGeom prst="rect">
             <a:avLst/>
           </a:prstGeom>
@@ -11319,6 +11532,139 @@
               <a:rPr lang="en" sz="2800" dirty="0"/>
               <a:t>When containers join, admin deploys any “orphaned” modules</a:t>
             </a:r>
+          </a:p>
+        </p:txBody>
+      </p:sp>
+      <p:sp>
+        <p:nvSpPr>
+          <p:cNvPr id="4" name="Slide Number Placeholder 3"/>
+          <p:cNvSpPr txBox="1">
+            <a:spLocks/>
+          </p:cNvSpPr>
+          <p:nvPr/>
+        </p:nvSpPr>
+        <p:spPr>
+          <a:xfrm>
+            <a:off x="6553200" y="4767263"/>
+            <a:ext cx="2133600" cy="273844"/>
+          </a:xfrm>
+          <a:prstGeom prst="rect">
+            <a:avLst/>
+          </a:prstGeom>
+        </p:spPr>
+        <p:txBody>
+          <a:bodyPr/>
+          <a:lstStyle>
+            <a:defPPr>
+              <a:defRPr lang="en-US"/>
+            </a:defPPr>
+            <a:lvl1pPr marL="0" algn="l" defTabSz="914400" rtl="0" eaLnBrk="1" latinLnBrk="0" hangingPunct="1">
+              <a:defRPr sz="1800" kern="1200">
+                <a:solidFill>
+                  <a:schemeClr val="tx1"/>
+                </a:solidFill>
+                <a:latin typeface="+mn-lt"/>
+                <a:ea typeface="+mn-ea"/>
+                <a:cs typeface="+mn-cs"/>
+              </a:defRPr>
+            </a:lvl1pPr>
+            <a:lvl2pPr marL="457200" algn="l" defTabSz="914400" rtl="0" eaLnBrk="1" latinLnBrk="0" hangingPunct="1">
+              <a:defRPr sz="1800" kern="1200">
+                <a:solidFill>
+                  <a:schemeClr val="tx1"/>
+                </a:solidFill>
+                <a:latin typeface="+mn-lt"/>
+                <a:ea typeface="+mn-ea"/>
+                <a:cs typeface="+mn-cs"/>
+              </a:defRPr>
+            </a:lvl2pPr>
+            <a:lvl3pPr marL="914400" algn="l" defTabSz="914400" rtl="0" eaLnBrk="1" latinLnBrk="0" hangingPunct="1">
+              <a:defRPr sz="1800" kern="1200">
+                <a:solidFill>
+                  <a:schemeClr val="tx1"/>
+                </a:solidFill>
+                <a:latin typeface="+mn-lt"/>
+                <a:ea typeface="+mn-ea"/>
+                <a:cs typeface="+mn-cs"/>
+              </a:defRPr>
+            </a:lvl3pPr>
+            <a:lvl4pPr marL="1371600" algn="l" defTabSz="914400" rtl="0" eaLnBrk="1" latinLnBrk="0" hangingPunct="1">
+              <a:defRPr sz="1800" kern="1200">
+                <a:solidFill>
+                  <a:schemeClr val="tx1"/>
+                </a:solidFill>
+                <a:latin typeface="+mn-lt"/>
+                <a:ea typeface="+mn-ea"/>
+                <a:cs typeface="+mn-cs"/>
+              </a:defRPr>
+            </a:lvl4pPr>
+            <a:lvl5pPr marL="1828800" algn="l" defTabSz="914400" rtl="0" eaLnBrk="1" latinLnBrk="0" hangingPunct="1">
+              <a:defRPr sz="1800" kern="1200">
+                <a:solidFill>
+                  <a:schemeClr val="tx1"/>
+                </a:solidFill>
+                <a:latin typeface="+mn-lt"/>
+                <a:ea typeface="+mn-ea"/>
+                <a:cs typeface="+mn-cs"/>
+              </a:defRPr>
+            </a:lvl5pPr>
+            <a:lvl6pPr marL="2286000" algn="l" defTabSz="914400" rtl="0" eaLnBrk="1" latinLnBrk="0" hangingPunct="1">
+              <a:defRPr sz="1800" kern="1200">
+                <a:solidFill>
+                  <a:schemeClr val="tx1"/>
+                </a:solidFill>
+                <a:latin typeface="+mn-lt"/>
+                <a:ea typeface="+mn-ea"/>
+                <a:cs typeface="+mn-cs"/>
+              </a:defRPr>
+            </a:lvl6pPr>
+            <a:lvl7pPr marL="2743200" algn="l" defTabSz="914400" rtl="0" eaLnBrk="1" latinLnBrk="0" hangingPunct="1">
+              <a:defRPr sz="1800" kern="1200">
+                <a:solidFill>
+                  <a:schemeClr val="tx1"/>
+                </a:solidFill>
+                <a:latin typeface="+mn-lt"/>
+                <a:ea typeface="+mn-ea"/>
+                <a:cs typeface="+mn-cs"/>
+              </a:defRPr>
+            </a:lvl7pPr>
+            <a:lvl8pPr marL="3200400" algn="l" defTabSz="914400" rtl="0" eaLnBrk="1" latinLnBrk="0" hangingPunct="1">
+              <a:defRPr sz="1800" kern="1200">
+                <a:solidFill>
+                  <a:schemeClr val="tx1"/>
+                </a:solidFill>
+                <a:latin typeface="+mn-lt"/>
+                <a:ea typeface="+mn-ea"/>
+                <a:cs typeface="+mn-cs"/>
+              </a:defRPr>
+            </a:lvl8pPr>
+            <a:lvl9pPr marL="3657600" algn="l" defTabSz="914400" rtl="0" eaLnBrk="1" latinLnBrk="0" hangingPunct="1">
+              <a:defRPr sz="1800" kern="1200">
+                <a:solidFill>
+                  <a:schemeClr val="tx1"/>
+                </a:solidFill>
+                <a:latin typeface="+mn-lt"/>
+                <a:ea typeface="+mn-ea"/>
+                <a:cs typeface="+mn-cs"/>
+              </a:defRPr>
+            </a:lvl9pPr>
+          </a:lstStyle>
+          <a:p>
+            <a:pPr algn="r"/>
+            <a:fld id="{3CA7D8A6-1136-4C38-ADB5-83A54ED516A9}" type="slidenum">
+              <a:rPr lang="en-US" sz="1200" smtClean="0">
+                <a:solidFill>
+                  <a:srgbClr val="7F7F7F"/>
+                </a:solidFill>
+              </a:rPr>
+              <a:pPr algn="r"/>
+              <a:t>14</a:t>
+            </a:fld>
+            <a:endParaRPr lang="en-US" sz="1200" dirty="0">
+              <a:solidFill>
+                <a:srgbClr val="7F7F7F"/>
+              </a:solidFill>
+            </a:endParaRPr>
           </a:p>
         </p:txBody>
       </p:sp>
@@ -11456,6 +11802,139 @@
           </a:p>
         </p:txBody>
       </p:sp>
+      <p:sp>
+        <p:nvSpPr>
+          <p:cNvPr id="4" name="Slide Number Placeholder 3"/>
+          <p:cNvSpPr txBox="1">
+            <a:spLocks/>
+          </p:cNvSpPr>
+          <p:nvPr/>
+        </p:nvSpPr>
+        <p:spPr>
+          <a:xfrm>
+            <a:off x="6553200" y="4767263"/>
+            <a:ext cx="2133600" cy="273844"/>
+          </a:xfrm>
+          <a:prstGeom prst="rect">
+            <a:avLst/>
+          </a:prstGeom>
+        </p:spPr>
+        <p:txBody>
+          <a:bodyPr/>
+          <a:lstStyle>
+            <a:defPPr>
+              <a:defRPr lang="en-US"/>
+            </a:defPPr>
+            <a:lvl1pPr marL="0" algn="l" defTabSz="914400" rtl="0" eaLnBrk="1" latinLnBrk="0" hangingPunct="1">
+              <a:defRPr sz="1800" kern="1200">
+                <a:solidFill>
+                  <a:schemeClr val="tx1"/>
+                </a:solidFill>
+                <a:latin typeface="+mn-lt"/>
+                <a:ea typeface="+mn-ea"/>
+                <a:cs typeface="+mn-cs"/>
+              </a:defRPr>
+            </a:lvl1pPr>
+            <a:lvl2pPr marL="457200" algn="l" defTabSz="914400" rtl="0" eaLnBrk="1" latinLnBrk="0" hangingPunct="1">
+              <a:defRPr sz="1800" kern="1200">
+                <a:solidFill>
+                  <a:schemeClr val="tx1"/>
+                </a:solidFill>
+                <a:latin typeface="+mn-lt"/>
+                <a:ea typeface="+mn-ea"/>
+                <a:cs typeface="+mn-cs"/>
+              </a:defRPr>
+            </a:lvl2pPr>
+            <a:lvl3pPr marL="914400" algn="l" defTabSz="914400" rtl="0" eaLnBrk="1" latinLnBrk="0" hangingPunct="1">
+              <a:defRPr sz="1800" kern="1200">
+                <a:solidFill>
+                  <a:schemeClr val="tx1"/>
+                </a:solidFill>
+                <a:latin typeface="+mn-lt"/>
+                <a:ea typeface="+mn-ea"/>
+                <a:cs typeface="+mn-cs"/>
+              </a:defRPr>
+            </a:lvl3pPr>
+            <a:lvl4pPr marL="1371600" algn="l" defTabSz="914400" rtl="0" eaLnBrk="1" latinLnBrk="0" hangingPunct="1">
+              <a:defRPr sz="1800" kern="1200">
+                <a:solidFill>
+                  <a:schemeClr val="tx1"/>
+                </a:solidFill>
+                <a:latin typeface="+mn-lt"/>
+                <a:ea typeface="+mn-ea"/>
+                <a:cs typeface="+mn-cs"/>
+              </a:defRPr>
+            </a:lvl4pPr>
+            <a:lvl5pPr marL="1828800" algn="l" defTabSz="914400" rtl="0" eaLnBrk="1" latinLnBrk="0" hangingPunct="1">
+              <a:defRPr sz="1800" kern="1200">
+                <a:solidFill>
+                  <a:schemeClr val="tx1"/>
+                </a:solidFill>
+                <a:latin typeface="+mn-lt"/>
+                <a:ea typeface="+mn-ea"/>
+                <a:cs typeface="+mn-cs"/>
+              </a:defRPr>
+            </a:lvl5pPr>
+            <a:lvl6pPr marL="2286000" algn="l" defTabSz="914400" rtl="0" eaLnBrk="1" latinLnBrk="0" hangingPunct="1">
+              <a:defRPr sz="1800" kern="1200">
+                <a:solidFill>
+                  <a:schemeClr val="tx1"/>
+                </a:solidFill>
+                <a:latin typeface="+mn-lt"/>
+                <a:ea typeface="+mn-ea"/>
+                <a:cs typeface="+mn-cs"/>
+              </a:defRPr>
+            </a:lvl6pPr>
+            <a:lvl7pPr marL="2743200" algn="l" defTabSz="914400" rtl="0" eaLnBrk="1" latinLnBrk="0" hangingPunct="1">
+              <a:defRPr sz="1800" kern="1200">
+                <a:solidFill>
+                  <a:schemeClr val="tx1"/>
+                </a:solidFill>
+                <a:latin typeface="+mn-lt"/>
+                <a:ea typeface="+mn-ea"/>
+                <a:cs typeface="+mn-cs"/>
+              </a:defRPr>
+            </a:lvl7pPr>
+            <a:lvl8pPr marL="3200400" algn="l" defTabSz="914400" rtl="0" eaLnBrk="1" latinLnBrk="0" hangingPunct="1">
+              <a:defRPr sz="1800" kern="1200">
+                <a:solidFill>
+                  <a:schemeClr val="tx1"/>
+                </a:solidFill>
+                <a:latin typeface="+mn-lt"/>
+                <a:ea typeface="+mn-ea"/>
+                <a:cs typeface="+mn-cs"/>
+              </a:defRPr>
+            </a:lvl8pPr>
+            <a:lvl9pPr marL="3657600" algn="l" defTabSz="914400" rtl="0" eaLnBrk="1" latinLnBrk="0" hangingPunct="1">
+              <a:defRPr sz="1800" kern="1200">
+                <a:solidFill>
+                  <a:schemeClr val="tx1"/>
+                </a:solidFill>
+                <a:latin typeface="+mn-lt"/>
+                <a:ea typeface="+mn-ea"/>
+                <a:cs typeface="+mn-cs"/>
+              </a:defRPr>
+            </a:lvl9pPr>
+          </a:lstStyle>
+          <a:p>
+            <a:pPr algn="r"/>
+            <a:fld id="{3CA7D8A6-1136-4C38-ADB5-83A54ED516A9}" type="slidenum">
+              <a:rPr lang="en-US" sz="1200" smtClean="0">
+                <a:solidFill>
+                  <a:srgbClr val="7F7F7F"/>
+                </a:solidFill>
+              </a:rPr>
+              <a:pPr algn="r"/>
+              <a:t>15</a:t>
+            </a:fld>
+            <a:endParaRPr lang="en-US" sz="1200" dirty="0">
+              <a:solidFill>
+                <a:srgbClr val="7F7F7F"/>
+              </a:solidFill>
+            </a:endParaRPr>
+          </a:p>
+        </p:txBody>
+      </p:sp>
     </p:spTree>
     <p:extLst>
       <p:ext uri="{BB962C8B-B14F-4D97-AF65-F5344CB8AC3E}">
@@ -11602,6 +12081,139 @@
           </a:p>
         </p:txBody>
       </p:sp>
+      <p:sp>
+        <p:nvSpPr>
+          <p:cNvPr id="4" name="Slide Number Placeholder 3"/>
+          <p:cNvSpPr txBox="1">
+            <a:spLocks/>
+          </p:cNvSpPr>
+          <p:nvPr/>
+        </p:nvSpPr>
+        <p:spPr>
+          <a:xfrm>
+            <a:off x="6553200" y="4767263"/>
+            <a:ext cx="2133600" cy="273844"/>
+          </a:xfrm>
+          <a:prstGeom prst="rect">
+            <a:avLst/>
+          </a:prstGeom>
+        </p:spPr>
+        <p:txBody>
+          <a:bodyPr/>
+          <a:lstStyle>
+            <a:defPPr>
+              <a:defRPr lang="en-US"/>
+            </a:defPPr>
+            <a:lvl1pPr marL="0" algn="l" defTabSz="914400" rtl="0" eaLnBrk="1" latinLnBrk="0" hangingPunct="1">
+              <a:defRPr sz="1800" kern="1200">
+                <a:solidFill>
+                  <a:schemeClr val="tx1"/>
+                </a:solidFill>
+                <a:latin typeface="+mn-lt"/>
+                <a:ea typeface="+mn-ea"/>
+                <a:cs typeface="+mn-cs"/>
+              </a:defRPr>
+            </a:lvl1pPr>
+            <a:lvl2pPr marL="457200" algn="l" defTabSz="914400" rtl="0" eaLnBrk="1" latinLnBrk="0" hangingPunct="1">
+              <a:defRPr sz="1800" kern="1200">
+                <a:solidFill>
+                  <a:schemeClr val="tx1"/>
+                </a:solidFill>
+                <a:latin typeface="+mn-lt"/>
+                <a:ea typeface="+mn-ea"/>
+                <a:cs typeface="+mn-cs"/>
+              </a:defRPr>
+            </a:lvl2pPr>
+            <a:lvl3pPr marL="914400" algn="l" defTabSz="914400" rtl="0" eaLnBrk="1" latinLnBrk="0" hangingPunct="1">
+              <a:defRPr sz="1800" kern="1200">
+                <a:solidFill>
+                  <a:schemeClr val="tx1"/>
+                </a:solidFill>
+                <a:latin typeface="+mn-lt"/>
+                <a:ea typeface="+mn-ea"/>
+                <a:cs typeface="+mn-cs"/>
+              </a:defRPr>
+            </a:lvl3pPr>
+            <a:lvl4pPr marL="1371600" algn="l" defTabSz="914400" rtl="0" eaLnBrk="1" latinLnBrk="0" hangingPunct="1">
+              <a:defRPr sz="1800" kern="1200">
+                <a:solidFill>
+                  <a:schemeClr val="tx1"/>
+                </a:solidFill>
+                <a:latin typeface="+mn-lt"/>
+                <a:ea typeface="+mn-ea"/>
+                <a:cs typeface="+mn-cs"/>
+              </a:defRPr>
+            </a:lvl4pPr>
+            <a:lvl5pPr marL="1828800" algn="l" defTabSz="914400" rtl="0" eaLnBrk="1" latinLnBrk="0" hangingPunct="1">
+              <a:defRPr sz="1800" kern="1200">
+                <a:solidFill>
+                  <a:schemeClr val="tx1"/>
+                </a:solidFill>
+                <a:latin typeface="+mn-lt"/>
+                <a:ea typeface="+mn-ea"/>
+                <a:cs typeface="+mn-cs"/>
+              </a:defRPr>
+            </a:lvl5pPr>
+            <a:lvl6pPr marL="2286000" algn="l" defTabSz="914400" rtl="0" eaLnBrk="1" latinLnBrk="0" hangingPunct="1">
+              <a:defRPr sz="1800" kern="1200">
+                <a:solidFill>
+                  <a:schemeClr val="tx1"/>
+                </a:solidFill>
+                <a:latin typeface="+mn-lt"/>
+                <a:ea typeface="+mn-ea"/>
+                <a:cs typeface="+mn-cs"/>
+              </a:defRPr>
+            </a:lvl6pPr>
+            <a:lvl7pPr marL="2743200" algn="l" defTabSz="914400" rtl="0" eaLnBrk="1" latinLnBrk="0" hangingPunct="1">
+              <a:defRPr sz="1800" kern="1200">
+                <a:solidFill>
+                  <a:schemeClr val="tx1"/>
+                </a:solidFill>
+                <a:latin typeface="+mn-lt"/>
+                <a:ea typeface="+mn-ea"/>
+                <a:cs typeface="+mn-cs"/>
+              </a:defRPr>
+            </a:lvl7pPr>
+            <a:lvl8pPr marL="3200400" algn="l" defTabSz="914400" rtl="0" eaLnBrk="1" latinLnBrk="0" hangingPunct="1">
+              <a:defRPr sz="1800" kern="1200">
+                <a:solidFill>
+                  <a:schemeClr val="tx1"/>
+                </a:solidFill>
+                <a:latin typeface="+mn-lt"/>
+                <a:ea typeface="+mn-ea"/>
+                <a:cs typeface="+mn-cs"/>
+              </a:defRPr>
+            </a:lvl8pPr>
+            <a:lvl9pPr marL="3657600" algn="l" defTabSz="914400" rtl="0" eaLnBrk="1" latinLnBrk="0" hangingPunct="1">
+              <a:defRPr sz="1800" kern="1200">
+                <a:solidFill>
+                  <a:schemeClr val="tx1"/>
+                </a:solidFill>
+                <a:latin typeface="+mn-lt"/>
+                <a:ea typeface="+mn-ea"/>
+                <a:cs typeface="+mn-cs"/>
+              </a:defRPr>
+            </a:lvl9pPr>
+          </a:lstStyle>
+          <a:p>
+            <a:pPr algn="r"/>
+            <a:fld id="{3CA7D8A6-1136-4C38-ADB5-83A54ED516A9}" type="slidenum">
+              <a:rPr lang="en-US" sz="1200" smtClean="0">
+                <a:solidFill>
+                  <a:srgbClr val="7F7F7F"/>
+                </a:solidFill>
+              </a:rPr>
+              <a:pPr algn="r"/>
+              <a:t>16</a:t>
+            </a:fld>
+            <a:endParaRPr lang="en-US" sz="1200" dirty="0">
+              <a:solidFill>
+                <a:srgbClr val="7F7F7F"/>
+              </a:solidFill>
+            </a:endParaRPr>
+          </a:p>
+        </p:txBody>
+      </p:sp>
     </p:spTree>
     <p:extLst>
       <p:ext uri="{BB962C8B-B14F-4D97-AF65-F5344CB8AC3E}">
@@ -11816,6 +12428,139 @@
           </a:ln>
         </p:spPr>
       </p:pic>
+      <p:sp>
+        <p:nvSpPr>
+          <p:cNvPr id="5" name="Slide Number Placeholder 3"/>
+          <p:cNvSpPr txBox="1">
+            <a:spLocks/>
+          </p:cNvSpPr>
+          <p:nvPr/>
+        </p:nvSpPr>
+        <p:spPr>
+          <a:xfrm>
+            <a:off x="6553200" y="4767263"/>
+            <a:ext cx="2133600" cy="273844"/>
+          </a:xfrm>
+          <a:prstGeom prst="rect">
+            <a:avLst/>
+          </a:prstGeom>
+        </p:spPr>
+        <p:txBody>
+          <a:bodyPr/>
+          <a:lstStyle>
+            <a:defPPr>
+              <a:defRPr lang="en-US"/>
+            </a:defPPr>
+            <a:lvl1pPr marL="0" algn="l" defTabSz="914400" rtl="0" eaLnBrk="1" latinLnBrk="0" hangingPunct="1">
+              <a:defRPr sz="1800" kern="1200">
+                <a:solidFill>
+                  <a:schemeClr val="tx1"/>
+                </a:solidFill>
+                <a:latin typeface="+mn-lt"/>
+                <a:ea typeface="+mn-ea"/>
+                <a:cs typeface="+mn-cs"/>
+              </a:defRPr>
+            </a:lvl1pPr>
+            <a:lvl2pPr marL="457200" algn="l" defTabSz="914400" rtl="0" eaLnBrk="1" latinLnBrk="0" hangingPunct="1">
+              <a:defRPr sz="1800" kern="1200">
+                <a:solidFill>
+                  <a:schemeClr val="tx1"/>
+                </a:solidFill>
+                <a:latin typeface="+mn-lt"/>
+                <a:ea typeface="+mn-ea"/>
+                <a:cs typeface="+mn-cs"/>
+              </a:defRPr>
+            </a:lvl2pPr>
+            <a:lvl3pPr marL="914400" algn="l" defTabSz="914400" rtl="0" eaLnBrk="1" latinLnBrk="0" hangingPunct="1">
+              <a:defRPr sz="1800" kern="1200">
+                <a:solidFill>
+                  <a:schemeClr val="tx1"/>
+                </a:solidFill>
+                <a:latin typeface="+mn-lt"/>
+                <a:ea typeface="+mn-ea"/>
+                <a:cs typeface="+mn-cs"/>
+              </a:defRPr>
+            </a:lvl3pPr>
+            <a:lvl4pPr marL="1371600" algn="l" defTabSz="914400" rtl="0" eaLnBrk="1" latinLnBrk="0" hangingPunct="1">
+              <a:defRPr sz="1800" kern="1200">
+                <a:solidFill>
+                  <a:schemeClr val="tx1"/>
+                </a:solidFill>
+                <a:latin typeface="+mn-lt"/>
+                <a:ea typeface="+mn-ea"/>
+                <a:cs typeface="+mn-cs"/>
+              </a:defRPr>
+            </a:lvl4pPr>
+            <a:lvl5pPr marL="1828800" algn="l" defTabSz="914400" rtl="0" eaLnBrk="1" latinLnBrk="0" hangingPunct="1">
+              <a:defRPr sz="1800" kern="1200">
+                <a:solidFill>
+                  <a:schemeClr val="tx1"/>
+                </a:solidFill>
+                <a:latin typeface="+mn-lt"/>
+                <a:ea typeface="+mn-ea"/>
+                <a:cs typeface="+mn-cs"/>
+              </a:defRPr>
+            </a:lvl5pPr>
+            <a:lvl6pPr marL="2286000" algn="l" defTabSz="914400" rtl="0" eaLnBrk="1" latinLnBrk="0" hangingPunct="1">
+              <a:defRPr sz="1800" kern="1200">
+                <a:solidFill>
+                  <a:schemeClr val="tx1"/>
+                </a:solidFill>
+                <a:latin typeface="+mn-lt"/>
+                <a:ea typeface="+mn-ea"/>
+                <a:cs typeface="+mn-cs"/>
+              </a:defRPr>
+            </a:lvl6pPr>
+            <a:lvl7pPr marL="2743200" algn="l" defTabSz="914400" rtl="0" eaLnBrk="1" latinLnBrk="0" hangingPunct="1">
+              <a:defRPr sz="1800" kern="1200">
+                <a:solidFill>
+                  <a:schemeClr val="tx1"/>
+                </a:solidFill>
+                <a:latin typeface="+mn-lt"/>
+                <a:ea typeface="+mn-ea"/>
+                <a:cs typeface="+mn-cs"/>
+              </a:defRPr>
+            </a:lvl7pPr>
+            <a:lvl8pPr marL="3200400" algn="l" defTabSz="914400" rtl="0" eaLnBrk="1" latinLnBrk="0" hangingPunct="1">
+              <a:defRPr sz="1800" kern="1200">
+                <a:solidFill>
+                  <a:schemeClr val="tx1"/>
+                </a:solidFill>
+                <a:latin typeface="+mn-lt"/>
+                <a:ea typeface="+mn-ea"/>
+                <a:cs typeface="+mn-cs"/>
+              </a:defRPr>
+            </a:lvl8pPr>
+            <a:lvl9pPr marL="3657600" algn="l" defTabSz="914400" rtl="0" eaLnBrk="1" latinLnBrk="0" hangingPunct="1">
+              <a:defRPr sz="1800" kern="1200">
+                <a:solidFill>
+                  <a:schemeClr val="tx1"/>
+                </a:solidFill>
+                <a:latin typeface="+mn-lt"/>
+                <a:ea typeface="+mn-ea"/>
+                <a:cs typeface="+mn-cs"/>
+              </a:defRPr>
+            </a:lvl9pPr>
+          </a:lstStyle>
+          <a:p>
+            <a:pPr algn="r"/>
+            <a:fld id="{3CA7D8A6-1136-4C38-ADB5-83A54ED516A9}" type="slidenum">
+              <a:rPr lang="en-US" sz="1200" smtClean="0">
+                <a:solidFill>
+                  <a:srgbClr val="7F7F7F"/>
+                </a:solidFill>
+              </a:rPr>
+              <a:pPr algn="r"/>
+              <a:t>17</a:t>
+            </a:fld>
+            <a:endParaRPr lang="en-US" sz="1200" dirty="0">
+              <a:solidFill>
+                <a:srgbClr val="7F7F7F"/>
+              </a:solidFill>
+            </a:endParaRPr>
+          </a:p>
+        </p:txBody>
+      </p:sp>
     </p:spTree>
     <p:extLst>
       <p:ext uri="{BB962C8B-B14F-4D97-AF65-F5344CB8AC3E}">
@@ -11971,7 +12716,7 @@
         <p:spPr>
           <a:xfrm>
             <a:off x="5029200" y="1047750"/>
-            <a:ext cx="3810000" cy="3962400"/>
+            <a:ext cx="3810000" cy="3733800"/>
           </a:xfrm>
           <a:prstGeom prst="rect">
             <a:avLst/>
@@ -11983,6 +12728,34 @@
           </a:ln>
         </p:spPr>
       </p:pic>
+      <p:sp>
+        <p:nvSpPr>
+          <p:cNvPr id="6" name="Slide Number Placeholder 3"/>
+          <p:cNvSpPr>
+            <a:spLocks noGrp="1"/>
+          </p:cNvSpPr>
+          <p:nvPr>
+            <p:ph type="sldNum" sz="quarter" idx="12"/>
+          </p:nvPr>
+        </p:nvSpPr>
+        <p:spPr>
+          <a:xfrm>
+            <a:off x="6553200" y="4767263"/>
+            <a:ext cx="2133600" cy="273844"/>
+          </a:xfrm>
+        </p:spPr>
+        <p:txBody>
+          <a:bodyPr/>
+          <a:lstStyle/>
+          <a:p>
+            <a:fld id="{3CA7D8A6-1136-4C38-ADB5-83A54ED516A9}" type="slidenum">
+              <a:rPr lang="en-US" smtClean="0"/>
+              <a:t>18</a:t>
+            </a:fld>
+            <a:endParaRPr lang="en-US" dirty="0"/>
+          </a:p>
+        </p:txBody>
+      </p:sp>
     </p:spTree>
     <p:extLst>
       <p:ext uri="{BB962C8B-B14F-4D97-AF65-F5344CB8AC3E}">
@@ -12109,6 +12882,34 @@
           </a:extLst>
         </p:spPr>
       </p:pic>
+      <p:sp>
+        <p:nvSpPr>
+          <p:cNvPr id="5" name="Slide Number Placeholder 3"/>
+          <p:cNvSpPr>
+            <a:spLocks noGrp="1"/>
+          </p:cNvSpPr>
+          <p:nvPr>
+            <p:ph type="sldNum" sz="quarter" idx="12"/>
+          </p:nvPr>
+        </p:nvSpPr>
+        <p:spPr>
+          <a:xfrm>
+            <a:off x="6553200" y="4767263"/>
+            <a:ext cx="2133600" cy="273844"/>
+          </a:xfrm>
+        </p:spPr>
+        <p:txBody>
+          <a:bodyPr/>
+          <a:lstStyle/>
+          <a:p>
+            <a:fld id="{3CA7D8A6-1136-4C38-ADB5-83A54ED516A9}" type="slidenum">
+              <a:rPr lang="en-US" smtClean="0"/>
+              <a:t>19</a:t>
+            </a:fld>
+            <a:endParaRPr lang="en-US" dirty="0"/>
+          </a:p>
+        </p:txBody>
+      </p:sp>
     </p:spTree>
     <p:extLst>
       <p:ext uri="{BB962C8B-B14F-4D97-AF65-F5344CB8AC3E}">
@@ -12329,7 +13130,7 @@
               <a:pPr/>
               <a:t>2</a:t>
             </a:fld>
-            <a:endParaRPr lang="en-US"/>
+            <a:endParaRPr lang="en-US" dirty="0"/>
           </a:p>
         </p:txBody>
       </p:sp>
@@ -12813,6 +13614,139 @@
           </a:p>
         </p:txBody>
       </p:sp>
+      <p:sp>
+        <p:nvSpPr>
+          <p:cNvPr id="4" name="Slide Number Placeholder 3"/>
+          <p:cNvSpPr txBox="1">
+            <a:spLocks/>
+          </p:cNvSpPr>
+          <p:nvPr/>
+        </p:nvSpPr>
+        <p:spPr>
+          <a:xfrm>
+            <a:off x="6553200" y="4767263"/>
+            <a:ext cx="2133600" cy="273844"/>
+          </a:xfrm>
+          <a:prstGeom prst="rect">
+            <a:avLst/>
+          </a:prstGeom>
+        </p:spPr>
+        <p:txBody>
+          <a:bodyPr/>
+          <a:lstStyle>
+            <a:defPPr>
+              <a:defRPr lang="en-US"/>
+            </a:defPPr>
+            <a:lvl1pPr marL="0" algn="l" defTabSz="914400" rtl="0" eaLnBrk="1" latinLnBrk="0" hangingPunct="1">
+              <a:defRPr sz="1800" kern="1200">
+                <a:solidFill>
+                  <a:schemeClr val="tx1"/>
+                </a:solidFill>
+                <a:latin typeface="+mn-lt"/>
+                <a:ea typeface="+mn-ea"/>
+                <a:cs typeface="+mn-cs"/>
+              </a:defRPr>
+            </a:lvl1pPr>
+            <a:lvl2pPr marL="457200" algn="l" defTabSz="914400" rtl="0" eaLnBrk="1" latinLnBrk="0" hangingPunct="1">
+              <a:defRPr sz="1800" kern="1200">
+                <a:solidFill>
+                  <a:schemeClr val="tx1"/>
+                </a:solidFill>
+                <a:latin typeface="+mn-lt"/>
+                <a:ea typeface="+mn-ea"/>
+                <a:cs typeface="+mn-cs"/>
+              </a:defRPr>
+            </a:lvl2pPr>
+            <a:lvl3pPr marL="914400" algn="l" defTabSz="914400" rtl="0" eaLnBrk="1" latinLnBrk="0" hangingPunct="1">
+              <a:defRPr sz="1800" kern="1200">
+                <a:solidFill>
+                  <a:schemeClr val="tx1"/>
+                </a:solidFill>
+                <a:latin typeface="+mn-lt"/>
+                <a:ea typeface="+mn-ea"/>
+                <a:cs typeface="+mn-cs"/>
+              </a:defRPr>
+            </a:lvl3pPr>
+            <a:lvl4pPr marL="1371600" algn="l" defTabSz="914400" rtl="0" eaLnBrk="1" latinLnBrk="0" hangingPunct="1">
+              <a:defRPr sz="1800" kern="1200">
+                <a:solidFill>
+                  <a:schemeClr val="tx1"/>
+                </a:solidFill>
+                <a:latin typeface="+mn-lt"/>
+                <a:ea typeface="+mn-ea"/>
+                <a:cs typeface="+mn-cs"/>
+              </a:defRPr>
+            </a:lvl4pPr>
+            <a:lvl5pPr marL="1828800" algn="l" defTabSz="914400" rtl="0" eaLnBrk="1" latinLnBrk="0" hangingPunct="1">
+              <a:defRPr sz="1800" kern="1200">
+                <a:solidFill>
+                  <a:schemeClr val="tx1"/>
+                </a:solidFill>
+                <a:latin typeface="+mn-lt"/>
+                <a:ea typeface="+mn-ea"/>
+                <a:cs typeface="+mn-cs"/>
+              </a:defRPr>
+            </a:lvl5pPr>
+            <a:lvl6pPr marL="2286000" algn="l" defTabSz="914400" rtl="0" eaLnBrk="1" latinLnBrk="0" hangingPunct="1">
+              <a:defRPr sz="1800" kern="1200">
+                <a:solidFill>
+                  <a:schemeClr val="tx1"/>
+                </a:solidFill>
+                <a:latin typeface="+mn-lt"/>
+                <a:ea typeface="+mn-ea"/>
+                <a:cs typeface="+mn-cs"/>
+              </a:defRPr>
+            </a:lvl6pPr>
+            <a:lvl7pPr marL="2743200" algn="l" defTabSz="914400" rtl="0" eaLnBrk="1" latinLnBrk="0" hangingPunct="1">
+              <a:defRPr sz="1800" kern="1200">
+                <a:solidFill>
+                  <a:schemeClr val="tx1"/>
+                </a:solidFill>
+                <a:latin typeface="+mn-lt"/>
+                <a:ea typeface="+mn-ea"/>
+                <a:cs typeface="+mn-cs"/>
+              </a:defRPr>
+            </a:lvl7pPr>
+            <a:lvl8pPr marL="3200400" algn="l" defTabSz="914400" rtl="0" eaLnBrk="1" latinLnBrk="0" hangingPunct="1">
+              <a:defRPr sz="1800" kern="1200">
+                <a:solidFill>
+                  <a:schemeClr val="tx1"/>
+                </a:solidFill>
+                <a:latin typeface="+mn-lt"/>
+                <a:ea typeface="+mn-ea"/>
+                <a:cs typeface="+mn-cs"/>
+              </a:defRPr>
+            </a:lvl8pPr>
+            <a:lvl9pPr marL="3657600" algn="l" defTabSz="914400" rtl="0" eaLnBrk="1" latinLnBrk="0" hangingPunct="1">
+              <a:defRPr sz="1800" kern="1200">
+                <a:solidFill>
+                  <a:schemeClr val="tx1"/>
+                </a:solidFill>
+                <a:latin typeface="+mn-lt"/>
+                <a:ea typeface="+mn-ea"/>
+                <a:cs typeface="+mn-cs"/>
+              </a:defRPr>
+            </a:lvl9pPr>
+          </a:lstStyle>
+          <a:p>
+            <a:pPr algn="r"/>
+            <a:fld id="{3CA7D8A6-1136-4C38-ADB5-83A54ED516A9}" type="slidenum">
+              <a:rPr lang="en-US" sz="1200" smtClean="0">
+                <a:solidFill>
+                  <a:srgbClr val="7F7F7F"/>
+                </a:solidFill>
+              </a:rPr>
+              <a:pPr algn="r"/>
+              <a:t>20</a:t>
+            </a:fld>
+            <a:endParaRPr lang="en-US" sz="1200" dirty="0">
+              <a:solidFill>
+                <a:srgbClr val="7F7F7F"/>
+              </a:solidFill>
+            </a:endParaRPr>
+          </a:p>
+        </p:txBody>
+      </p:sp>
     </p:spTree>
     <p:extLst>
       <p:ext uri="{BB962C8B-B14F-4D97-AF65-F5344CB8AC3E}">
@@ -12954,6 +13888,139 @@
           </a:p>
         </p:txBody>
       </p:sp>
+      <p:sp>
+        <p:nvSpPr>
+          <p:cNvPr id="4" name="Slide Number Placeholder 3"/>
+          <p:cNvSpPr txBox="1">
+            <a:spLocks/>
+          </p:cNvSpPr>
+          <p:nvPr/>
+        </p:nvSpPr>
+        <p:spPr>
+          <a:xfrm>
+            <a:off x="6553200" y="4767263"/>
+            <a:ext cx="2133600" cy="273844"/>
+          </a:xfrm>
+          <a:prstGeom prst="rect">
+            <a:avLst/>
+          </a:prstGeom>
+        </p:spPr>
+        <p:txBody>
+          <a:bodyPr/>
+          <a:lstStyle>
+            <a:defPPr>
+              <a:defRPr lang="en-US"/>
+            </a:defPPr>
+            <a:lvl1pPr marL="0" algn="l" defTabSz="914400" rtl="0" eaLnBrk="1" latinLnBrk="0" hangingPunct="1">
+              <a:defRPr sz="1800" kern="1200">
+                <a:solidFill>
+                  <a:schemeClr val="tx1"/>
+                </a:solidFill>
+                <a:latin typeface="+mn-lt"/>
+                <a:ea typeface="+mn-ea"/>
+                <a:cs typeface="+mn-cs"/>
+              </a:defRPr>
+            </a:lvl1pPr>
+            <a:lvl2pPr marL="457200" algn="l" defTabSz="914400" rtl="0" eaLnBrk="1" latinLnBrk="0" hangingPunct="1">
+              <a:defRPr sz="1800" kern="1200">
+                <a:solidFill>
+                  <a:schemeClr val="tx1"/>
+                </a:solidFill>
+                <a:latin typeface="+mn-lt"/>
+                <a:ea typeface="+mn-ea"/>
+                <a:cs typeface="+mn-cs"/>
+              </a:defRPr>
+            </a:lvl2pPr>
+            <a:lvl3pPr marL="914400" algn="l" defTabSz="914400" rtl="0" eaLnBrk="1" latinLnBrk="0" hangingPunct="1">
+              <a:defRPr sz="1800" kern="1200">
+                <a:solidFill>
+                  <a:schemeClr val="tx1"/>
+                </a:solidFill>
+                <a:latin typeface="+mn-lt"/>
+                <a:ea typeface="+mn-ea"/>
+                <a:cs typeface="+mn-cs"/>
+              </a:defRPr>
+            </a:lvl3pPr>
+            <a:lvl4pPr marL="1371600" algn="l" defTabSz="914400" rtl="0" eaLnBrk="1" latinLnBrk="0" hangingPunct="1">
+              <a:defRPr sz="1800" kern="1200">
+                <a:solidFill>
+                  <a:schemeClr val="tx1"/>
+                </a:solidFill>
+                <a:latin typeface="+mn-lt"/>
+                <a:ea typeface="+mn-ea"/>
+                <a:cs typeface="+mn-cs"/>
+              </a:defRPr>
+            </a:lvl4pPr>
+            <a:lvl5pPr marL="1828800" algn="l" defTabSz="914400" rtl="0" eaLnBrk="1" latinLnBrk="0" hangingPunct="1">
+              <a:defRPr sz="1800" kern="1200">
+                <a:solidFill>
+                  <a:schemeClr val="tx1"/>
+                </a:solidFill>
+                <a:latin typeface="+mn-lt"/>
+                <a:ea typeface="+mn-ea"/>
+                <a:cs typeface="+mn-cs"/>
+              </a:defRPr>
+            </a:lvl5pPr>
+            <a:lvl6pPr marL="2286000" algn="l" defTabSz="914400" rtl="0" eaLnBrk="1" latinLnBrk="0" hangingPunct="1">
+              <a:defRPr sz="1800" kern="1200">
+                <a:solidFill>
+                  <a:schemeClr val="tx1"/>
+                </a:solidFill>
+                <a:latin typeface="+mn-lt"/>
+                <a:ea typeface="+mn-ea"/>
+                <a:cs typeface="+mn-cs"/>
+              </a:defRPr>
+            </a:lvl6pPr>
+            <a:lvl7pPr marL="2743200" algn="l" defTabSz="914400" rtl="0" eaLnBrk="1" latinLnBrk="0" hangingPunct="1">
+              <a:defRPr sz="1800" kern="1200">
+                <a:solidFill>
+                  <a:schemeClr val="tx1"/>
+                </a:solidFill>
+                <a:latin typeface="+mn-lt"/>
+                <a:ea typeface="+mn-ea"/>
+                <a:cs typeface="+mn-cs"/>
+              </a:defRPr>
+            </a:lvl7pPr>
+            <a:lvl8pPr marL="3200400" algn="l" defTabSz="914400" rtl="0" eaLnBrk="1" latinLnBrk="0" hangingPunct="1">
+              <a:defRPr sz="1800" kern="1200">
+                <a:solidFill>
+                  <a:schemeClr val="tx1"/>
+                </a:solidFill>
+                <a:latin typeface="+mn-lt"/>
+                <a:ea typeface="+mn-ea"/>
+                <a:cs typeface="+mn-cs"/>
+              </a:defRPr>
+            </a:lvl8pPr>
+            <a:lvl9pPr marL="3657600" algn="l" defTabSz="914400" rtl="0" eaLnBrk="1" latinLnBrk="0" hangingPunct="1">
+              <a:defRPr sz="1800" kern="1200">
+                <a:solidFill>
+                  <a:schemeClr val="tx1"/>
+                </a:solidFill>
+                <a:latin typeface="+mn-lt"/>
+                <a:ea typeface="+mn-ea"/>
+                <a:cs typeface="+mn-cs"/>
+              </a:defRPr>
+            </a:lvl9pPr>
+          </a:lstStyle>
+          <a:p>
+            <a:pPr algn="r"/>
+            <a:fld id="{3CA7D8A6-1136-4C38-ADB5-83A54ED516A9}" type="slidenum">
+              <a:rPr lang="en-US" sz="1200" smtClean="0">
+                <a:solidFill>
+                  <a:srgbClr val="7F7F7F"/>
+                </a:solidFill>
+              </a:rPr>
+              <a:pPr algn="r"/>
+              <a:t>21</a:t>
+            </a:fld>
+            <a:endParaRPr lang="en-US" sz="1200" dirty="0">
+              <a:solidFill>
+                <a:srgbClr val="7F7F7F"/>
+              </a:solidFill>
+            </a:endParaRPr>
+          </a:p>
+        </p:txBody>
+      </p:sp>
     </p:spTree>
     <p:extLst>
       <p:ext uri="{BB962C8B-B14F-4D97-AF65-F5344CB8AC3E}">
@@ -13051,6 +14118,34 @@
           </a:extLst>
         </p:spPr>
       </p:pic>
+      <p:sp>
+        <p:nvSpPr>
+          <p:cNvPr id="7" name="Slide Number Placeholder 3"/>
+          <p:cNvSpPr>
+            <a:spLocks noGrp="1"/>
+          </p:cNvSpPr>
+          <p:nvPr>
+            <p:ph type="sldNum" sz="quarter" idx="12"/>
+          </p:nvPr>
+        </p:nvSpPr>
+        <p:spPr>
+          <a:xfrm>
+            <a:off x="6553200" y="4781550"/>
+            <a:ext cx="2133600" cy="273844"/>
+          </a:xfrm>
+        </p:spPr>
+        <p:txBody>
+          <a:bodyPr/>
+          <a:lstStyle/>
+          <a:p>
+            <a:fld id="{3CA7D8A6-1136-4C38-ADB5-83A54ED516A9}" type="slidenum">
+              <a:rPr lang="en-US" smtClean="0"/>
+              <a:t>22</a:t>
+            </a:fld>
+            <a:endParaRPr lang="en-US" dirty="0"/>
+          </a:p>
+        </p:txBody>
+      </p:sp>
     </p:spTree>
     <p:extLst>
       <p:ext uri="{BB962C8B-B14F-4D97-AF65-F5344CB8AC3E}">
@@ -13266,6 +14361,139 @@
               <a:rPr lang="en" sz="1800" dirty="0"/>
               <a:t> </a:t>
             </a:r>
+          </a:p>
+        </p:txBody>
+      </p:sp>
+      <p:sp>
+        <p:nvSpPr>
+          <p:cNvPr id="4" name="Slide Number Placeholder 3"/>
+          <p:cNvSpPr txBox="1">
+            <a:spLocks/>
+          </p:cNvSpPr>
+          <p:nvPr/>
+        </p:nvSpPr>
+        <p:spPr>
+          <a:xfrm>
+            <a:off x="6553200" y="4767263"/>
+            <a:ext cx="2133600" cy="273844"/>
+          </a:xfrm>
+          <a:prstGeom prst="rect">
+            <a:avLst/>
+          </a:prstGeom>
+        </p:spPr>
+        <p:txBody>
+          <a:bodyPr/>
+          <a:lstStyle>
+            <a:defPPr>
+              <a:defRPr lang="en-US"/>
+            </a:defPPr>
+            <a:lvl1pPr marL="0" algn="l" defTabSz="914400" rtl="0" eaLnBrk="1" latinLnBrk="0" hangingPunct="1">
+              <a:defRPr sz="1800" kern="1200">
+                <a:solidFill>
+                  <a:schemeClr val="tx1"/>
+                </a:solidFill>
+                <a:latin typeface="+mn-lt"/>
+                <a:ea typeface="+mn-ea"/>
+                <a:cs typeface="+mn-cs"/>
+              </a:defRPr>
+            </a:lvl1pPr>
+            <a:lvl2pPr marL="457200" algn="l" defTabSz="914400" rtl="0" eaLnBrk="1" latinLnBrk="0" hangingPunct="1">
+              <a:defRPr sz="1800" kern="1200">
+                <a:solidFill>
+                  <a:schemeClr val="tx1"/>
+                </a:solidFill>
+                <a:latin typeface="+mn-lt"/>
+                <a:ea typeface="+mn-ea"/>
+                <a:cs typeface="+mn-cs"/>
+              </a:defRPr>
+            </a:lvl2pPr>
+            <a:lvl3pPr marL="914400" algn="l" defTabSz="914400" rtl="0" eaLnBrk="1" latinLnBrk="0" hangingPunct="1">
+              <a:defRPr sz="1800" kern="1200">
+                <a:solidFill>
+                  <a:schemeClr val="tx1"/>
+                </a:solidFill>
+                <a:latin typeface="+mn-lt"/>
+                <a:ea typeface="+mn-ea"/>
+                <a:cs typeface="+mn-cs"/>
+              </a:defRPr>
+            </a:lvl3pPr>
+            <a:lvl4pPr marL="1371600" algn="l" defTabSz="914400" rtl="0" eaLnBrk="1" latinLnBrk="0" hangingPunct="1">
+              <a:defRPr sz="1800" kern="1200">
+                <a:solidFill>
+                  <a:schemeClr val="tx1"/>
+                </a:solidFill>
+                <a:latin typeface="+mn-lt"/>
+                <a:ea typeface="+mn-ea"/>
+                <a:cs typeface="+mn-cs"/>
+              </a:defRPr>
+            </a:lvl4pPr>
+            <a:lvl5pPr marL="1828800" algn="l" defTabSz="914400" rtl="0" eaLnBrk="1" latinLnBrk="0" hangingPunct="1">
+              <a:defRPr sz="1800" kern="1200">
+                <a:solidFill>
+                  <a:schemeClr val="tx1"/>
+                </a:solidFill>
+                <a:latin typeface="+mn-lt"/>
+                <a:ea typeface="+mn-ea"/>
+                <a:cs typeface="+mn-cs"/>
+              </a:defRPr>
+            </a:lvl5pPr>
+            <a:lvl6pPr marL="2286000" algn="l" defTabSz="914400" rtl="0" eaLnBrk="1" latinLnBrk="0" hangingPunct="1">
+              <a:defRPr sz="1800" kern="1200">
+                <a:solidFill>
+                  <a:schemeClr val="tx1"/>
+                </a:solidFill>
+                <a:latin typeface="+mn-lt"/>
+                <a:ea typeface="+mn-ea"/>
+                <a:cs typeface="+mn-cs"/>
+              </a:defRPr>
+            </a:lvl6pPr>
+            <a:lvl7pPr marL="2743200" algn="l" defTabSz="914400" rtl="0" eaLnBrk="1" latinLnBrk="0" hangingPunct="1">
+              <a:defRPr sz="1800" kern="1200">
+                <a:solidFill>
+                  <a:schemeClr val="tx1"/>
+                </a:solidFill>
+                <a:latin typeface="+mn-lt"/>
+                <a:ea typeface="+mn-ea"/>
+                <a:cs typeface="+mn-cs"/>
+              </a:defRPr>
+            </a:lvl7pPr>
+            <a:lvl8pPr marL="3200400" algn="l" defTabSz="914400" rtl="0" eaLnBrk="1" latinLnBrk="0" hangingPunct="1">
+              <a:defRPr sz="1800" kern="1200">
+                <a:solidFill>
+                  <a:schemeClr val="tx1"/>
+                </a:solidFill>
+                <a:latin typeface="+mn-lt"/>
+                <a:ea typeface="+mn-ea"/>
+                <a:cs typeface="+mn-cs"/>
+              </a:defRPr>
+            </a:lvl8pPr>
+            <a:lvl9pPr marL="3657600" algn="l" defTabSz="914400" rtl="0" eaLnBrk="1" latinLnBrk="0" hangingPunct="1">
+              <a:defRPr sz="1800" kern="1200">
+                <a:solidFill>
+                  <a:schemeClr val="tx1"/>
+                </a:solidFill>
+                <a:latin typeface="+mn-lt"/>
+                <a:ea typeface="+mn-ea"/>
+                <a:cs typeface="+mn-cs"/>
+              </a:defRPr>
+            </a:lvl9pPr>
+          </a:lstStyle>
+          <a:p>
+            <a:pPr algn="r"/>
+            <a:fld id="{3CA7D8A6-1136-4C38-ADB5-83A54ED516A9}" type="slidenum">
+              <a:rPr lang="en-US" sz="1200" smtClean="0">
+                <a:solidFill>
+                  <a:srgbClr val="7F7F7F"/>
+                </a:solidFill>
+              </a:rPr>
+              <a:pPr algn="r"/>
+              <a:t>23</a:t>
+            </a:fld>
+            <a:endParaRPr lang="en-US" sz="1200" dirty="0">
+              <a:solidFill>
+                <a:srgbClr val="7F7F7F"/>
+              </a:solidFill>
+            </a:endParaRPr>
           </a:p>
         </p:txBody>
       </p:sp>
@@ -13426,6 +14654,139 @@
           </a:ln>
         </p:spPr>
       </p:pic>
+      <p:sp>
+        <p:nvSpPr>
+          <p:cNvPr id="7" name="Slide Number Placeholder 3"/>
+          <p:cNvSpPr txBox="1">
+            <a:spLocks/>
+          </p:cNvSpPr>
+          <p:nvPr/>
+        </p:nvSpPr>
+        <p:spPr>
+          <a:xfrm>
+            <a:off x="6553200" y="4767263"/>
+            <a:ext cx="2133600" cy="273844"/>
+          </a:xfrm>
+          <a:prstGeom prst="rect">
+            <a:avLst/>
+          </a:prstGeom>
+        </p:spPr>
+        <p:txBody>
+          <a:bodyPr/>
+          <a:lstStyle>
+            <a:defPPr>
+              <a:defRPr lang="en-US"/>
+            </a:defPPr>
+            <a:lvl1pPr marL="0" algn="l" defTabSz="914400" rtl="0" eaLnBrk="1" latinLnBrk="0" hangingPunct="1">
+              <a:defRPr sz="1800" kern="1200">
+                <a:solidFill>
+                  <a:schemeClr val="tx1"/>
+                </a:solidFill>
+                <a:latin typeface="+mn-lt"/>
+                <a:ea typeface="+mn-ea"/>
+                <a:cs typeface="+mn-cs"/>
+              </a:defRPr>
+            </a:lvl1pPr>
+            <a:lvl2pPr marL="457200" algn="l" defTabSz="914400" rtl="0" eaLnBrk="1" latinLnBrk="0" hangingPunct="1">
+              <a:defRPr sz="1800" kern="1200">
+                <a:solidFill>
+                  <a:schemeClr val="tx1"/>
+                </a:solidFill>
+                <a:latin typeface="+mn-lt"/>
+                <a:ea typeface="+mn-ea"/>
+                <a:cs typeface="+mn-cs"/>
+              </a:defRPr>
+            </a:lvl2pPr>
+            <a:lvl3pPr marL="914400" algn="l" defTabSz="914400" rtl="0" eaLnBrk="1" latinLnBrk="0" hangingPunct="1">
+              <a:defRPr sz="1800" kern="1200">
+                <a:solidFill>
+                  <a:schemeClr val="tx1"/>
+                </a:solidFill>
+                <a:latin typeface="+mn-lt"/>
+                <a:ea typeface="+mn-ea"/>
+                <a:cs typeface="+mn-cs"/>
+              </a:defRPr>
+            </a:lvl3pPr>
+            <a:lvl4pPr marL="1371600" algn="l" defTabSz="914400" rtl="0" eaLnBrk="1" latinLnBrk="0" hangingPunct="1">
+              <a:defRPr sz="1800" kern="1200">
+                <a:solidFill>
+                  <a:schemeClr val="tx1"/>
+                </a:solidFill>
+                <a:latin typeface="+mn-lt"/>
+                <a:ea typeface="+mn-ea"/>
+                <a:cs typeface="+mn-cs"/>
+              </a:defRPr>
+            </a:lvl4pPr>
+            <a:lvl5pPr marL="1828800" algn="l" defTabSz="914400" rtl="0" eaLnBrk="1" latinLnBrk="0" hangingPunct="1">
+              <a:defRPr sz="1800" kern="1200">
+                <a:solidFill>
+                  <a:schemeClr val="tx1"/>
+                </a:solidFill>
+                <a:latin typeface="+mn-lt"/>
+                <a:ea typeface="+mn-ea"/>
+                <a:cs typeface="+mn-cs"/>
+              </a:defRPr>
+            </a:lvl5pPr>
+            <a:lvl6pPr marL="2286000" algn="l" defTabSz="914400" rtl="0" eaLnBrk="1" latinLnBrk="0" hangingPunct="1">
+              <a:defRPr sz="1800" kern="1200">
+                <a:solidFill>
+                  <a:schemeClr val="tx1"/>
+                </a:solidFill>
+                <a:latin typeface="+mn-lt"/>
+                <a:ea typeface="+mn-ea"/>
+                <a:cs typeface="+mn-cs"/>
+              </a:defRPr>
+            </a:lvl6pPr>
+            <a:lvl7pPr marL="2743200" algn="l" defTabSz="914400" rtl="0" eaLnBrk="1" latinLnBrk="0" hangingPunct="1">
+              <a:defRPr sz="1800" kern="1200">
+                <a:solidFill>
+                  <a:schemeClr val="tx1"/>
+                </a:solidFill>
+                <a:latin typeface="+mn-lt"/>
+                <a:ea typeface="+mn-ea"/>
+                <a:cs typeface="+mn-cs"/>
+              </a:defRPr>
+            </a:lvl7pPr>
+            <a:lvl8pPr marL="3200400" algn="l" defTabSz="914400" rtl="0" eaLnBrk="1" latinLnBrk="0" hangingPunct="1">
+              <a:defRPr sz="1800" kern="1200">
+                <a:solidFill>
+                  <a:schemeClr val="tx1"/>
+                </a:solidFill>
+                <a:latin typeface="+mn-lt"/>
+                <a:ea typeface="+mn-ea"/>
+                <a:cs typeface="+mn-cs"/>
+              </a:defRPr>
+            </a:lvl8pPr>
+            <a:lvl9pPr marL="3657600" algn="l" defTabSz="914400" rtl="0" eaLnBrk="1" latinLnBrk="0" hangingPunct="1">
+              <a:defRPr sz="1800" kern="1200">
+                <a:solidFill>
+                  <a:schemeClr val="tx1"/>
+                </a:solidFill>
+                <a:latin typeface="+mn-lt"/>
+                <a:ea typeface="+mn-ea"/>
+                <a:cs typeface="+mn-cs"/>
+              </a:defRPr>
+            </a:lvl9pPr>
+          </a:lstStyle>
+          <a:p>
+            <a:pPr algn="r"/>
+            <a:fld id="{3CA7D8A6-1136-4C38-ADB5-83A54ED516A9}" type="slidenum">
+              <a:rPr lang="en-US" sz="1200" smtClean="0">
+                <a:solidFill>
+                  <a:srgbClr val="7F7F7F"/>
+                </a:solidFill>
+              </a:rPr>
+              <a:pPr algn="r"/>
+              <a:t>24</a:t>
+            </a:fld>
+            <a:endParaRPr lang="en-US" sz="1200" dirty="0">
+              <a:solidFill>
+                <a:srgbClr val="7F7F7F"/>
+              </a:solidFill>
+            </a:endParaRPr>
+          </a:p>
+        </p:txBody>
+      </p:sp>
     </p:spTree>
     <p:extLst>
       <p:ext uri="{BB962C8B-B14F-4D97-AF65-F5344CB8AC3E}">
@@ -13603,6 +14964,139 @@
           </a:p>
         </p:txBody>
       </p:sp>
+      <p:sp>
+        <p:nvSpPr>
+          <p:cNvPr id="4" name="Slide Number Placeholder 3"/>
+          <p:cNvSpPr txBox="1">
+            <a:spLocks/>
+          </p:cNvSpPr>
+          <p:nvPr/>
+        </p:nvSpPr>
+        <p:spPr>
+          <a:xfrm>
+            <a:off x="6553200" y="4767263"/>
+            <a:ext cx="2133600" cy="273844"/>
+          </a:xfrm>
+          <a:prstGeom prst="rect">
+            <a:avLst/>
+          </a:prstGeom>
+        </p:spPr>
+        <p:txBody>
+          <a:bodyPr/>
+          <a:lstStyle>
+            <a:defPPr>
+              <a:defRPr lang="en-US"/>
+            </a:defPPr>
+            <a:lvl1pPr marL="0" algn="l" defTabSz="914400" rtl="0" eaLnBrk="1" latinLnBrk="0" hangingPunct="1">
+              <a:defRPr sz="1800" kern="1200">
+                <a:solidFill>
+                  <a:schemeClr val="tx1"/>
+                </a:solidFill>
+                <a:latin typeface="+mn-lt"/>
+                <a:ea typeface="+mn-ea"/>
+                <a:cs typeface="+mn-cs"/>
+              </a:defRPr>
+            </a:lvl1pPr>
+            <a:lvl2pPr marL="457200" algn="l" defTabSz="914400" rtl="0" eaLnBrk="1" latinLnBrk="0" hangingPunct="1">
+              <a:defRPr sz="1800" kern="1200">
+                <a:solidFill>
+                  <a:schemeClr val="tx1"/>
+                </a:solidFill>
+                <a:latin typeface="+mn-lt"/>
+                <a:ea typeface="+mn-ea"/>
+                <a:cs typeface="+mn-cs"/>
+              </a:defRPr>
+            </a:lvl2pPr>
+            <a:lvl3pPr marL="914400" algn="l" defTabSz="914400" rtl="0" eaLnBrk="1" latinLnBrk="0" hangingPunct="1">
+              <a:defRPr sz="1800" kern="1200">
+                <a:solidFill>
+                  <a:schemeClr val="tx1"/>
+                </a:solidFill>
+                <a:latin typeface="+mn-lt"/>
+                <a:ea typeface="+mn-ea"/>
+                <a:cs typeface="+mn-cs"/>
+              </a:defRPr>
+            </a:lvl3pPr>
+            <a:lvl4pPr marL="1371600" algn="l" defTabSz="914400" rtl="0" eaLnBrk="1" latinLnBrk="0" hangingPunct="1">
+              <a:defRPr sz="1800" kern="1200">
+                <a:solidFill>
+                  <a:schemeClr val="tx1"/>
+                </a:solidFill>
+                <a:latin typeface="+mn-lt"/>
+                <a:ea typeface="+mn-ea"/>
+                <a:cs typeface="+mn-cs"/>
+              </a:defRPr>
+            </a:lvl4pPr>
+            <a:lvl5pPr marL="1828800" algn="l" defTabSz="914400" rtl="0" eaLnBrk="1" latinLnBrk="0" hangingPunct="1">
+              <a:defRPr sz="1800" kern="1200">
+                <a:solidFill>
+                  <a:schemeClr val="tx1"/>
+                </a:solidFill>
+                <a:latin typeface="+mn-lt"/>
+                <a:ea typeface="+mn-ea"/>
+                <a:cs typeface="+mn-cs"/>
+              </a:defRPr>
+            </a:lvl5pPr>
+            <a:lvl6pPr marL="2286000" algn="l" defTabSz="914400" rtl="0" eaLnBrk="1" latinLnBrk="0" hangingPunct="1">
+              <a:defRPr sz="1800" kern="1200">
+                <a:solidFill>
+                  <a:schemeClr val="tx1"/>
+                </a:solidFill>
+                <a:latin typeface="+mn-lt"/>
+                <a:ea typeface="+mn-ea"/>
+                <a:cs typeface="+mn-cs"/>
+              </a:defRPr>
+            </a:lvl6pPr>
+            <a:lvl7pPr marL="2743200" algn="l" defTabSz="914400" rtl="0" eaLnBrk="1" latinLnBrk="0" hangingPunct="1">
+              <a:defRPr sz="1800" kern="1200">
+                <a:solidFill>
+                  <a:schemeClr val="tx1"/>
+                </a:solidFill>
+                <a:latin typeface="+mn-lt"/>
+                <a:ea typeface="+mn-ea"/>
+                <a:cs typeface="+mn-cs"/>
+              </a:defRPr>
+            </a:lvl7pPr>
+            <a:lvl8pPr marL="3200400" algn="l" defTabSz="914400" rtl="0" eaLnBrk="1" latinLnBrk="0" hangingPunct="1">
+              <a:defRPr sz="1800" kern="1200">
+                <a:solidFill>
+                  <a:schemeClr val="tx1"/>
+                </a:solidFill>
+                <a:latin typeface="+mn-lt"/>
+                <a:ea typeface="+mn-ea"/>
+                <a:cs typeface="+mn-cs"/>
+              </a:defRPr>
+            </a:lvl8pPr>
+            <a:lvl9pPr marL="3657600" algn="l" defTabSz="914400" rtl="0" eaLnBrk="1" latinLnBrk="0" hangingPunct="1">
+              <a:defRPr sz="1800" kern="1200">
+                <a:solidFill>
+                  <a:schemeClr val="tx1"/>
+                </a:solidFill>
+                <a:latin typeface="+mn-lt"/>
+                <a:ea typeface="+mn-ea"/>
+                <a:cs typeface="+mn-cs"/>
+              </a:defRPr>
+            </a:lvl9pPr>
+          </a:lstStyle>
+          <a:p>
+            <a:pPr algn="r"/>
+            <a:fld id="{3CA7D8A6-1136-4C38-ADB5-83A54ED516A9}" type="slidenum">
+              <a:rPr lang="en-US" sz="1200" smtClean="0">
+                <a:solidFill>
+                  <a:srgbClr val="7F7F7F"/>
+                </a:solidFill>
+              </a:rPr>
+              <a:pPr algn="r"/>
+              <a:t>25</a:t>
+            </a:fld>
+            <a:endParaRPr lang="en-US" sz="1200" dirty="0">
+              <a:solidFill>
+                <a:srgbClr val="7F7F7F"/>
+              </a:solidFill>
+            </a:endParaRPr>
+          </a:p>
+        </p:txBody>
+      </p:sp>
     </p:spTree>
     <p:extLst>
       <p:ext uri="{BB962C8B-B14F-4D97-AF65-F5344CB8AC3E}">
@@ -14289,6 +15783,139 @@
           </a:p>
         </p:txBody>
       </p:sp>
+      <p:sp>
+        <p:nvSpPr>
+          <p:cNvPr id="5" name="Slide Number Placeholder 3"/>
+          <p:cNvSpPr txBox="1">
+            <a:spLocks/>
+          </p:cNvSpPr>
+          <p:nvPr/>
+        </p:nvSpPr>
+        <p:spPr>
+          <a:xfrm>
+            <a:off x="6553200" y="4767263"/>
+            <a:ext cx="2133600" cy="273844"/>
+          </a:xfrm>
+          <a:prstGeom prst="rect">
+            <a:avLst/>
+          </a:prstGeom>
+        </p:spPr>
+        <p:txBody>
+          <a:bodyPr/>
+          <a:lstStyle>
+            <a:defPPr>
+              <a:defRPr lang="en-US"/>
+            </a:defPPr>
+            <a:lvl1pPr marL="0" algn="l" defTabSz="914400" rtl="0" eaLnBrk="1" latinLnBrk="0" hangingPunct="1">
+              <a:defRPr sz="1800" kern="1200">
+                <a:solidFill>
+                  <a:schemeClr val="tx1"/>
+                </a:solidFill>
+                <a:latin typeface="+mn-lt"/>
+                <a:ea typeface="+mn-ea"/>
+                <a:cs typeface="+mn-cs"/>
+              </a:defRPr>
+            </a:lvl1pPr>
+            <a:lvl2pPr marL="457200" algn="l" defTabSz="914400" rtl="0" eaLnBrk="1" latinLnBrk="0" hangingPunct="1">
+              <a:defRPr sz="1800" kern="1200">
+                <a:solidFill>
+                  <a:schemeClr val="tx1"/>
+                </a:solidFill>
+                <a:latin typeface="+mn-lt"/>
+                <a:ea typeface="+mn-ea"/>
+                <a:cs typeface="+mn-cs"/>
+              </a:defRPr>
+            </a:lvl2pPr>
+            <a:lvl3pPr marL="914400" algn="l" defTabSz="914400" rtl="0" eaLnBrk="1" latinLnBrk="0" hangingPunct="1">
+              <a:defRPr sz="1800" kern="1200">
+                <a:solidFill>
+                  <a:schemeClr val="tx1"/>
+                </a:solidFill>
+                <a:latin typeface="+mn-lt"/>
+                <a:ea typeface="+mn-ea"/>
+                <a:cs typeface="+mn-cs"/>
+              </a:defRPr>
+            </a:lvl3pPr>
+            <a:lvl4pPr marL="1371600" algn="l" defTabSz="914400" rtl="0" eaLnBrk="1" latinLnBrk="0" hangingPunct="1">
+              <a:defRPr sz="1800" kern="1200">
+                <a:solidFill>
+                  <a:schemeClr val="tx1"/>
+                </a:solidFill>
+                <a:latin typeface="+mn-lt"/>
+                <a:ea typeface="+mn-ea"/>
+                <a:cs typeface="+mn-cs"/>
+              </a:defRPr>
+            </a:lvl4pPr>
+            <a:lvl5pPr marL="1828800" algn="l" defTabSz="914400" rtl="0" eaLnBrk="1" latinLnBrk="0" hangingPunct="1">
+              <a:defRPr sz="1800" kern="1200">
+                <a:solidFill>
+                  <a:schemeClr val="tx1"/>
+                </a:solidFill>
+                <a:latin typeface="+mn-lt"/>
+                <a:ea typeface="+mn-ea"/>
+                <a:cs typeface="+mn-cs"/>
+              </a:defRPr>
+            </a:lvl5pPr>
+            <a:lvl6pPr marL="2286000" algn="l" defTabSz="914400" rtl="0" eaLnBrk="1" latinLnBrk="0" hangingPunct="1">
+              <a:defRPr sz="1800" kern="1200">
+                <a:solidFill>
+                  <a:schemeClr val="tx1"/>
+                </a:solidFill>
+                <a:latin typeface="+mn-lt"/>
+                <a:ea typeface="+mn-ea"/>
+                <a:cs typeface="+mn-cs"/>
+              </a:defRPr>
+            </a:lvl6pPr>
+            <a:lvl7pPr marL="2743200" algn="l" defTabSz="914400" rtl="0" eaLnBrk="1" latinLnBrk="0" hangingPunct="1">
+              <a:defRPr sz="1800" kern="1200">
+                <a:solidFill>
+                  <a:schemeClr val="tx1"/>
+                </a:solidFill>
+                <a:latin typeface="+mn-lt"/>
+                <a:ea typeface="+mn-ea"/>
+                <a:cs typeface="+mn-cs"/>
+              </a:defRPr>
+            </a:lvl7pPr>
+            <a:lvl8pPr marL="3200400" algn="l" defTabSz="914400" rtl="0" eaLnBrk="1" latinLnBrk="0" hangingPunct="1">
+              <a:defRPr sz="1800" kern="1200">
+                <a:solidFill>
+                  <a:schemeClr val="tx1"/>
+                </a:solidFill>
+                <a:latin typeface="+mn-lt"/>
+                <a:ea typeface="+mn-ea"/>
+                <a:cs typeface="+mn-cs"/>
+              </a:defRPr>
+            </a:lvl8pPr>
+            <a:lvl9pPr marL="3657600" algn="l" defTabSz="914400" rtl="0" eaLnBrk="1" latinLnBrk="0" hangingPunct="1">
+              <a:defRPr sz="1800" kern="1200">
+                <a:solidFill>
+                  <a:schemeClr val="tx1"/>
+                </a:solidFill>
+                <a:latin typeface="+mn-lt"/>
+                <a:ea typeface="+mn-ea"/>
+                <a:cs typeface="+mn-cs"/>
+              </a:defRPr>
+            </a:lvl9pPr>
+          </a:lstStyle>
+          <a:p>
+            <a:pPr algn="r"/>
+            <a:fld id="{3CA7D8A6-1136-4C38-ADB5-83A54ED516A9}" type="slidenum">
+              <a:rPr lang="en-US" sz="1200" smtClean="0">
+                <a:solidFill>
+                  <a:srgbClr val="7F7F7F"/>
+                </a:solidFill>
+              </a:rPr>
+              <a:pPr algn="r"/>
+              <a:t>26</a:t>
+            </a:fld>
+            <a:endParaRPr lang="en-US" sz="1200" dirty="0">
+              <a:solidFill>
+                <a:srgbClr val="7F7F7F"/>
+              </a:solidFill>
+            </a:endParaRPr>
+          </a:p>
+        </p:txBody>
+      </p:sp>
     </p:spTree>
     <p:extLst>
       <p:ext uri="{BB962C8B-B14F-4D97-AF65-F5344CB8AC3E}">
@@ -14806,6 +16433,34 @@
           </a:p>
         </p:txBody>
       </p:sp>
+      <p:sp>
+        <p:nvSpPr>
+          <p:cNvPr id="5" name="Slide Number Placeholder 3"/>
+          <p:cNvSpPr>
+            <a:spLocks noGrp="1"/>
+          </p:cNvSpPr>
+          <p:nvPr>
+            <p:ph type="sldNum" sz="quarter" idx="12"/>
+          </p:nvPr>
+        </p:nvSpPr>
+        <p:spPr>
+          <a:xfrm>
+            <a:off x="6553200" y="4767263"/>
+            <a:ext cx="2133600" cy="273844"/>
+          </a:xfrm>
+        </p:spPr>
+        <p:txBody>
+          <a:bodyPr/>
+          <a:lstStyle/>
+          <a:p>
+            <a:fld id="{3CA7D8A6-1136-4C38-ADB5-83A54ED516A9}" type="slidenum">
+              <a:rPr lang="en-US" smtClean="0"/>
+              <a:t>27</a:t>
+            </a:fld>
+            <a:endParaRPr lang="en-US" dirty="0"/>
+          </a:p>
+        </p:txBody>
+      </p:sp>
     </p:spTree>
     <p:extLst>
       <p:ext uri="{BB962C8B-B14F-4D97-AF65-F5344CB8AC3E}">
@@ -15021,6 +16676,34 @@
           </a:p>
         </p:txBody>
       </p:sp>
+      <p:sp>
+        <p:nvSpPr>
+          <p:cNvPr id="4" name="Slide Number Placeholder 3"/>
+          <p:cNvSpPr>
+            <a:spLocks noGrp="1"/>
+          </p:cNvSpPr>
+          <p:nvPr>
+            <p:ph type="sldNum" sz="quarter" idx="12"/>
+          </p:nvPr>
+        </p:nvSpPr>
+        <p:spPr>
+          <a:xfrm>
+            <a:off x="6553200" y="4767263"/>
+            <a:ext cx="2133600" cy="273844"/>
+          </a:xfrm>
+        </p:spPr>
+        <p:txBody>
+          <a:bodyPr/>
+          <a:lstStyle/>
+          <a:p>
+            <a:fld id="{3CA7D8A6-1136-4C38-ADB5-83A54ED516A9}" type="slidenum">
+              <a:rPr lang="en-US" smtClean="0"/>
+              <a:t>28</a:t>
+            </a:fld>
+            <a:endParaRPr lang="en-US" dirty="0"/>
+          </a:p>
+        </p:txBody>
+      </p:sp>
     </p:spTree>
     <p:extLst>
       <p:ext uri="{BB962C8B-B14F-4D97-AF65-F5344CB8AC3E}">
@@ -15148,6 +16831,34 @@
           </a:extLst>
         </p:spPr>
       </p:pic>
+      <p:sp>
+        <p:nvSpPr>
+          <p:cNvPr id="5" name="Slide Number Placeholder 3"/>
+          <p:cNvSpPr>
+            <a:spLocks noGrp="1"/>
+          </p:cNvSpPr>
+          <p:nvPr>
+            <p:ph type="sldNum" sz="quarter" idx="12"/>
+          </p:nvPr>
+        </p:nvSpPr>
+        <p:spPr>
+          <a:xfrm>
+            <a:off x="6553200" y="4767263"/>
+            <a:ext cx="2133600" cy="273844"/>
+          </a:xfrm>
+        </p:spPr>
+        <p:txBody>
+          <a:bodyPr/>
+          <a:lstStyle/>
+          <a:p>
+            <a:fld id="{3CA7D8A6-1136-4C38-ADB5-83A54ED516A9}" type="slidenum">
+              <a:rPr lang="en-US" smtClean="0"/>
+              <a:t>29</a:t>
+            </a:fld>
+            <a:endParaRPr lang="en-US" dirty="0"/>
+          </a:p>
+        </p:txBody>
+      </p:sp>
     </p:spTree>
     <p:extLst>
       <p:ext uri="{BB962C8B-B14F-4D97-AF65-F5344CB8AC3E}">
@@ -16775,6 +18486,34 @@
           </a:p>
         </p:txBody>
       </p:sp>
+      <p:sp>
+        <p:nvSpPr>
+          <p:cNvPr id="4" name="Slide Number Placeholder 3"/>
+          <p:cNvSpPr>
+            <a:spLocks noGrp="1"/>
+          </p:cNvSpPr>
+          <p:nvPr>
+            <p:ph type="sldNum" sz="quarter" idx="12"/>
+          </p:nvPr>
+        </p:nvSpPr>
+        <p:spPr>
+          <a:xfrm>
+            <a:off x="6553200" y="4767263"/>
+            <a:ext cx="2133600" cy="273844"/>
+          </a:xfrm>
+        </p:spPr>
+        <p:txBody>
+          <a:bodyPr/>
+          <a:lstStyle/>
+          <a:p>
+            <a:fld id="{3CA7D8A6-1136-4C38-ADB5-83A54ED516A9}" type="slidenum">
+              <a:rPr lang="en-US" smtClean="0"/>
+              <a:t>7</a:t>
+            </a:fld>
+            <a:endParaRPr lang="en-US" dirty="0"/>
+          </a:p>
+        </p:txBody>
+      </p:sp>
     </p:spTree>
     <p:extLst>
       <p:ext uri="{BB962C8B-B14F-4D97-AF65-F5344CB8AC3E}">
@@ -16854,7 +18593,7 @@
         </p:nvSpPr>
         <p:spPr>
           <a:xfrm>
-            <a:off x="457200" y="1200150"/>
+            <a:off x="457200" y="1047750"/>
             <a:ext cx="8229600" cy="3693288"/>
           </a:xfrm>
           <a:prstGeom prst="rect">
@@ -16969,6 +18708,143 @@
               </a:rPr>
               <a:t>://github.com/SpringOne2GX-2014/Spring-XD-Internals/tree/master/jms-message-bus</a:t>
             </a:r>
+          </a:p>
+        </p:txBody>
+      </p:sp>
+      <p:sp>
+        <p:nvSpPr>
+          <p:cNvPr id="5" name="Slide Number Placeholder 3"/>
+          <p:cNvSpPr txBox="1">
+            <a:spLocks/>
+          </p:cNvSpPr>
+          <p:nvPr/>
+        </p:nvSpPr>
+        <p:spPr>
+          <a:xfrm>
+            <a:off x="6553200" y="4781550"/>
+            <a:ext cx="2133600" cy="273844"/>
+          </a:xfrm>
+          <a:prstGeom prst="rect">
+            <a:avLst/>
+          </a:prstGeom>
+        </p:spPr>
+        <p:txBody>
+          <a:bodyPr/>
+          <a:lstStyle>
+            <a:defPPr>
+              <a:defRPr lang="en-US"/>
+            </a:defPPr>
+            <a:lvl1pPr marL="0" algn="l" defTabSz="914400" rtl="0" eaLnBrk="1" latinLnBrk="0" hangingPunct="1">
+              <a:defRPr sz="1800" kern="1200">
+                <a:solidFill>
+                  <a:schemeClr val="tx1"/>
+                </a:solidFill>
+                <a:latin typeface="+mn-lt"/>
+                <a:ea typeface="+mn-ea"/>
+                <a:cs typeface="+mn-cs"/>
+              </a:defRPr>
+            </a:lvl1pPr>
+            <a:lvl2pPr marL="457200" algn="l" defTabSz="914400" rtl="0" eaLnBrk="1" latinLnBrk="0" hangingPunct="1">
+              <a:defRPr sz="1800" kern="1200">
+                <a:solidFill>
+                  <a:schemeClr val="tx1"/>
+                </a:solidFill>
+                <a:latin typeface="+mn-lt"/>
+                <a:ea typeface="+mn-ea"/>
+                <a:cs typeface="+mn-cs"/>
+              </a:defRPr>
+            </a:lvl2pPr>
+            <a:lvl3pPr marL="914400" algn="l" defTabSz="914400" rtl="0" eaLnBrk="1" latinLnBrk="0" hangingPunct="1">
+              <a:defRPr sz="1800" kern="1200">
+                <a:solidFill>
+                  <a:schemeClr val="tx1"/>
+                </a:solidFill>
+                <a:latin typeface="+mn-lt"/>
+                <a:ea typeface="+mn-ea"/>
+                <a:cs typeface="+mn-cs"/>
+              </a:defRPr>
+            </a:lvl3pPr>
+            <a:lvl4pPr marL="1371600" algn="l" defTabSz="914400" rtl="0" eaLnBrk="1" latinLnBrk="0" hangingPunct="1">
+              <a:defRPr sz="1800" kern="1200">
+                <a:solidFill>
+                  <a:schemeClr val="tx1"/>
+                </a:solidFill>
+                <a:latin typeface="+mn-lt"/>
+                <a:ea typeface="+mn-ea"/>
+                <a:cs typeface="+mn-cs"/>
+              </a:defRPr>
+            </a:lvl4pPr>
+            <a:lvl5pPr marL="1828800" algn="l" defTabSz="914400" rtl="0" eaLnBrk="1" latinLnBrk="0" hangingPunct="1">
+              <a:defRPr sz="1800" kern="1200">
+                <a:solidFill>
+                  <a:schemeClr val="tx1"/>
+                </a:solidFill>
+                <a:latin typeface="+mn-lt"/>
+                <a:ea typeface="+mn-ea"/>
+                <a:cs typeface="+mn-cs"/>
+              </a:defRPr>
+            </a:lvl5pPr>
+            <a:lvl6pPr marL="2286000" algn="l" defTabSz="914400" rtl="0" eaLnBrk="1" latinLnBrk="0" hangingPunct="1">
+              <a:defRPr sz="1800" kern="1200">
+                <a:solidFill>
+                  <a:schemeClr val="tx1"/>
+                </a:solidFill>
+                <a:latin typeface="+mn-lt"/>
+                <a:ea typeface="+mn-ea"/>
+                <a:cs typeface="+mn-cs"/>
+              </a:defRPr>
+            </a:lvl6pPr>
+            <a:lvl7pPr marL="2743200" algn="l" defTabSz="914400" rtl="0" eaLnBrk="1" latinLnBrk="0" hangingPunct="1">
+              <a:defRPr sz="1800" kern="1200">
+                <a:solidFill>
+                  <a:schemeClr val="tx1"/>
+                </a:solidFill>
+                <a:latin typeface="+mn-lt"/>
+                <a:ea typeface="+mn-ea"/>
+                <a:cs typeface="+mn-cs"/>
+              </a:defRPr>
+            </a:lvl7pPr>
+            <a:lvl8pPr marL="3200400" algn="l" defTabSz="914400" rtl="0" eaLnBrk="1" latinLnBrk="0" hangingPunct="1">
+              <a:defRPr sz="1800" kern="1200">
+                <a:solidFill>
+                  <a:schemeClr val="tx1"/>
+                </a:solidFill>
+                <a:latin typeface="+mn-lt"/>
+                <a:ea typeface="+mn-ea"/>
+                <a:cs typeface="+mn-cs"/>
+              </a:defRPr>
+            </a:lvl8pPr>
+            <a:lvl9pPr marL="3657600" algn="l" defTabSz="914400" rtl="0" eaLnBrk="1" latinLnBrk="0" hangingPunct="1">
+              <a:defRPr sz="1800" kern="1200">
+                <a:solidFill>
+                  <a:schemeClr val="tx1"/>
+                </a:solidFill>
+                <a:latin typeface="+mn-lt"/>
+                <a:ea typeface="+mn-ea"/>
+                <a:cs typeface="+mn-cs"/>
+              </a:defRPr>
+            </a:lvl9pPr>
+          </a:lstStyle>
+          <a:p>
+            <a:pPr algn="r"/>
+            <a:fld id="{3CA7D8A6-1136-4C38-ADB5-83A54ED516A9}" type="slidenum">
+              <a:rPr lang="en-US" sz="1200" smtClean="0">
+                <a:solidFill>
+                  <a:schemeClr val="bg1">
+                    <a:lumMod val="50000"/>
+                  </a:schemeClr>
+                </a:solidFill>
+              </a:rPr>
+              <a:pPr algn="r"/>
+              <a:t>8</a:t>
+            </a:fld>
+            <a:endParaRPr lang="en-US" sz="1200" dirty="0">
+              <a:solidFill>
+                <a:schemeClr val="bg1">
+                  <a:lumMod val="50000"/>
+                </a:schemeClr>
+              </a:solidFill>
+            </a:endParaRPr>
           </a:p>
         </p:txBody>
       </p:sp>
@@ -17036,6 +18912,25 @@
               <a:rPr lang="en"/>
               <a:t>Spring XD Application Contexts</a:t>
             </a:r>
+          </a:p>
+        </p:txBody>
+      </p:sp>
+      <p:sp>
+        <p:nvSpPr>
+          <p:cNvPr id="2" name="Content Placeholder 1"/>
+          <p:cNvSpPr>
+            <a:spLocks noGrp="1"/>
+          </p:cNvSpPr>
+          <p:nvPr>
+            <p:ph idx="1"/>
+          </p:nvPr>
+        </p:nvSpPr>
+        <p:spPr/>
+        <p:txBody>
+          <a:bodyPr/>
+          <a:lstStyle/>
+          <a:p>
+            <a:endParaRPr lang="en-US"/>
           </a:p>
         </p:txBody>
       </p:sp>
@@ -17256,6 +19151,139 @@
           </a:extLst>
         </p:spPr>
       </p:pic>
+      <p:sp>
+        <p:nvSpPr>
+          <p:cNvPr id="7" name="Slide Number Placeholder 3"/>
+          <p:cNvSpPr txBox="1">
+            <a:spLocks/>
+          </p:cNvSpPr>
+          <p:nvPr/>
+        </p:nvSpPr>
+        <p:spPr>
+          <a:xfrm>
+            <a:off x="6553200" y="4767263"/>
+            <a:ext cx="2133600" cy="273844"/>
+          </a:xfrm>
+          <a:prstGeom prst="rect">
+            <a:avLst/>
+          </a:prstGeom>
+        </p:spPr>
+        <p:txBody>
+          <a:bodyPr/>
+          <a:lstStyle>
+            <a:defPPr>
+              <a:defRPr lang="en-US"/>
+            </a:defPPr>
+            <a:lvl1pPr marL="0" algn="l" defTabSz="914400" rtl="0" eaLnBrk="1" latinLnBrk="0" hangingPunct="1">
+              <a:defRPr sz="1800" kern="1200">
+                <a:solidFill>
+                  <a:schemeClr val="tx1"/>
+                </a:solidFill>
+                <a:latin typeface="+mn-lt"/>
+                <a:ea typeface="+mn-ea"/>
+                <a:cs typeface="+mn-cs"/>
+              </a:defRPr>
+            </a:lvl1pPr>
+            <a:lvl2pPr marL="457200" algn="l" defTabSz="914400" rtl="0" eaLnBrk="1" latinLnBrk="0" hangingPunct="1">
+              <a:defRPr sz="1800" kern="1200">
+                <a:solidFill>
+                  <a:schemeClr val="tx1"/>
+                </a:solidFill>
+                <a:latin typeface="+mn-lt"/>
+                <a:ea typeface="+mn-ea"/>
+                <a:cs typeface="+mn-cs"/>
+              </a:defRPr>
+            </a:lvl2pPr>
+            <a:lvl3pPr marL="914400" algn="l" defTabSz="914400" rtl="0" eaLnBrk="1" latinLnBrk="0" hangingPunct="1">
+              <a:defRPr sz="1800" kern="1200">
+                <a:solidFill>
+                  <a:schemeClr val="tx1"/>
+                </a:solidFill>
+                <a:latin typeface="+mn-lt"/>
+                <a:ea typeface="+mn-ea"/>
+                <a:cs typeface="+mn-cs"/>
+              </a:defRPr>
+            </a:lvl3pPr>
+            <a:lvl4pPr marL="1371600" algn="l" defTabSz="914400" rtl="0" eaLnBrk="1" latinLnBrk="0" hangingPunct="1">
+              <a:defRPr sz="1800" kern="1200">
+                <a:solidFill>
+                  <a:schemeClr val="tx1"/>
+                </a:solidFill>
+                <a:latin typeface="+mn-lt"/>
+                <a:ea typeface="+mn-ea"/>
+                <a:cs typeface="+mn-cs"/>
+              </a:defRPr>
+            </a:lvl4pPr>
+            <a:lvl5pPr marL="1828800" algn="l" defTabSz="914400" rtl="0" eaLnBrk="1" latinLnBrk="0" hangingPunct="1">
+              <a:defRPr sz="1800" kern="1200">
+                <a:solidFill>
+                  <a:schemeClr val="tx1"/>
+                </a:solidFill>
+                <a:latin typeface="+mn-lt"/>
+                <a:ea typeface="+mn-ea"/>
+                <a:cs typeface="+mn-cs"/>
+              </a:defRPr>
+            </a:lvl5pPr>
+            <a:lvl6pPr marL="2286000" algn="l" defTabSz="914400" rtl="0" eaLnBrk="1" latinLnBrk="0" hangingPunct="1">
+              <a:defRPr sz="1800" kern="1200">
+                <a:solidFill>
+                  <a:schemeClr val="tx1"/>
+                </a:solidFill>
+                <a:latin typeface="+mn-lt"/>
+                <a:ea typeface="+mn-ea"/>
+                <a:cs typeface="+mn-cs"/>
+              </a:defRPr>
+            </a:lvl6pPr>
+            <a:lvl7pPr marL="2743200" algn="l" defTabSz="914400" rtl="0" eaLnBrk="1" latinLnBrk="0" hangingPunct="1">
+              <a:defRPr sz="1800" kern="1200">
+                <a:solidFill>
+                  <a:schemeClr val="tx1"/>
+                </a:solidFill>
+                <a:latin typeface="+mn-lt"/>
+                <a:ea typeface="+mn-ea"/>
+                <a:cs typeface="+mn-cs"/>
+              </a:defRPr>
+            </a:lvl7pPr>
+            <a:lvl8pPr marL="3200400" algn="l" defTabSz="914400" rtl="0" eaLnBrk="1" latinLnBrk="0" hangingPunct="1">
+              <a:defRPr sz="1800" kern="1200">
+                <a:solidFill>
+                  <a:schemeClr val="tx1"/>
+                </a:solidFill>
+                <a:latin typeface="+mn-lt"/>
+                <a:ea typeface="+mn-ea"/>
+                <a:cs typeface="+mn-cs"/>
+              </a:defRPr>
+            </a:lvl8pPr>
+            <a:lvl9pPr marL="3657600" algn="l" defTabSz="914400" rtl="0" eaLnBrk="1" latinLnBrk="0" hangingPunct="1">
+              <a:defRPr sz="1800" kern="1200">
+                <a:solidFill>
+                  <a:schemeClr val="tx1"/>
+                </a:solidFill>
+                <a:latin typeface="+mn-lt"/>
+                <a:ea typeface="+mn-ea"/>
+                <a:cs typeface="+mn-cs"/>
+              </a:defRPr>
+            </a:lvl9pPr>
+          </a:lstStyle>
+          <a:p>
+            <a:pPr algn="r"/>
+            <a:fld id="{3CA7D8A6-1136-4C38-ADB5-83A54ED516A9}" type="slidenum">
+              <a:rPr lang="en-US" sz="1200" smtClean="0">
+                <a:solidFill>
+                  <a:srgbClr val="7F7F7F"/>
+                </a:solidFill>
+              </a:rPr>
+              <a:pPr algn="r"/>
+              <a:t>9</a:t>
+            </a:fld>
+            <a:endParaRPr lang="en-US" sz="1200" dirty="0">
+              <a:solidFill>
+                <a:srgbClr val="7F7F7F"/>
+              </a:solidFill>
+            </a:endParaRPr>
+          </a:p>
+        </p:txBody>
+      </p:sp>
     </p:spTree>
     <p:extLst>
       <p:ext uri="{BB962C8B-B14F-4D97-AF65-F5344CB8AC3E}">

</xml_diff>